<commit_message>
Cambios en el pptx y en el readme
</commit_message>
<xml_diff>
--- a/docs/Trabajo práctico integrador.pptx
+++ b/docs/Trabajo práctico integrador.pptx
@@ -5,7 +5,7 @@
     <p:sldMasterId id="2147483659" r:id="rId1"/>
   </p:sldMasterIdLst>
   <p:notesMasterIdLst>
-    <p:notesMasterId r:id="rId21"/>
+    <p:notesMasterId r:id="rId22"/>
   </p:notesMasterIdLst>
   <p:sldIdLst>
     <p:sldId id="256" r:id="rId2"/>
@@ -26,7 +26,8 @@
     <p:sldId id="268" r:id="rId17"/>
     <p:sldId id="269" r:id="rId18"/>
     <p:sldId id="270" r:id="rId19"/>
-    <p:sldId id="271" r:id="rId20"/>
+    <p:sldId id="275" r:id="rId20"/>
+    <p:sldId id="271" r:id="rId21"/>
   </p:sldIdLst>
   <p:sldSz cx="9144000" cy="5143500" type="screen16x9"/>
   <p:notesSz cx="6858000" cy="9144000"/>
@@ -261,7 +262,7 @@
   </p:defaultTextStyle>
   <p:extLst>
     <p:ext uri="{EFAFB233-063F-42B5-8137-9DF3F51BA10A}">
-      <p15:sldGuideLst xmlns:ahyp="http://schemas.microsoft.com/office/drawing/2018/hyperlinkcolor" xmlns:p15="http://schemas.microsoft.com/office/powerpoint/2012/main" xmlns:p14="http://schemas.microsoft.com/office/powerpoint/2010/main" xmlns:com="http://schemas.openxmlformats.org/drawingml/2006/compatibility" xmlns:pvml="urn:schemas-microsoft-com:office:powerpoint" xmlns:v="urn:schemas-microsoft-com:vml" xmlns:o="urn:schemas-microsoft-com:office:office" xmlns:dgm="http://schemas.openxmlformats.org/drawingml/2006/diagram" xmlns:c="http://schemas.openxmlformats.org/drawingml/2006/chart" xmlns:mv="urn:schemas-microsoft-com:mac:vml" xmlns:mc="http://schemas.openxmlformats.org/markup-compatibility/2006" xmlns="">
+      <p15:sldGuideLst xmlns="" xmlns:mc="http://schemas.openxmlformats.org/markup-compatibility/2006" xmlns:mv="urn:schemas-microsoft-com:mac:vml" xmlns:c="http://schemas.openxmlformats.org/drawingml/2006/chart" xmlns:dgm="http://schemas.openxmlformats.org/drawingml/2006/diagram" xmlns:o="urn:schemas-microsoft-com:office:office" xmlns:v="urn:schemas-microsoft-com:vml" xmlns:pvml="urn:schemas-microsoft-com:office:powerpoint" xmlns:com="http://schemas.openxmlformats.org/drawingml/2006/compatibility" xmlns:p14="http://schemas.microsoft.com/office/powerpoint/2010/main" xmlns:p15="http://schemas.microsoft.com/office/powerpoint/2012/main" xmlns:ahyp="http://schemas.microsoft.com/office/drawing/2018/hyperlinkcolor">
         <p15:guide id="1" orient="horz" pos="1620">
           <p15:clr>
             <a:srgbClr val="747775"/>
@@ -7680,7 +7681,7 @@
         </p:nvSpPr>
         <p:spPr>
           <a:xfrm>
-            <a:off x="2328600" y="425325"/>
+            <a:off x="3096245" y="425325"/>
             <a:ext cx="4486800" cy="572700"/>
           </a:xfrm>
           <a:prstGeom prst="rect">
@@ -7703,10 +7704,10 @@
               <a:buNone/>
             </a:pPr>
             <a:r>
-              <a:rPr lang="es"/>
-              <a:t>Cambios en la clase Servidor</a:t>
+              <a:rPr lang="es" dirty="0" smtClean="0"/>
+              <a:t>Clase Servidor</a:t>
             </a:r>
-            <a:endParaRPr/>
+            <a:endParaRPr dirty="0"/>
           </a:p>
         </p:txBody>
       </p:sp>
@@ -7726,7 +7727,7 @@
         </p:blipFill>
         <p:spPr>
           <a:xfrm>
-            <a:off x="1679675" y="1515000"/>
+            <a:off x="1679674" y="1244067"/>
             <a:ext cx="5553075" cy="2790825"/>
           </a:xfrm>
           <a:prstGeom prst="rect">
@@ -8382,7 +8383,7 @@
         </p:blipFill>
         <p:spPr>
           <a:xfrm>
-            <a:off x="1151700" y="2048125"/>
+            <a:off x="1151699" y="1743325"/>
             <a:ext cx="7000875" cy="2133600"/>
           </a:xfrm>
           <a:prstGeom prst="rect">
@@ -8454,10 +8455,10 @@
               <a:buNone/>
             </a:pPr>
             <a:r>
-              <a:rPr lang="es"/>
+              <a:rPr lang="es" dirty="0"/>
               <a:t>Mover carpeta recursiva</a:t>
             </a:r>
-            <a:endParaRPr/>
+            <a:endParaRPr dirty="0"/>
           </a:p>
           <a:p>
             <a:pPr marL="0" lvl="0" indent="0" algn="l" rtl="0">
@@ -8469,7 +8470,7 @@
               </a:spcAft>
               <a:buNone/>
             </a:pPr>
-            <a:endParaRPr/>
+            <a:endParaRPr dirty="0"/>
           </a:p>
         </p:txBody>
       </p:sp>
@@ -8489,7 +8490,7 @@
         </p:blipFill>
         <p:spPr>
           <a:xfrm>
-            <a:off x="1485900" y="1478725"/>
+            <a:off x="1485900" y="1173925"/>
             <a:ext cx="6172200" cy="1838325"/>
           </a:xfrm>
           <a:prstGeom prst="rect">
@@ -8501,6 +8502,323 @@
           </a:ln>
         </p:spPr>
       </p:pic>
+      <p:sp>
+        <p:nvSpPr>
+          <p:cNvPr id="5" name="Google Shape;145;p27"/>
+          <p:cNvSpPr txBox="1">
+            <a:spLocks/>
+          </p:cNvSpPr>
+          <p:nvPr/>
+        </p:nvSpPr>
+        <p:spPr>
+          <a:xfrm>
+            <a:off x="311700" y="3318046"/>
+            <a:ext cx="8520600" cy="1558753"/>
+          </a:xfrm>
+          <a:prstGeom prst="rect">
+            <a:avLst/>
+          </a:prstGeom>
+          <a:noFill/>
+          <a:ln>
+            <a:noFill/>
+          </a:ln>
+        </p:spPr>
+        <p:txBody>
+          <a:bodyPr spcFirstLastPara="1" wrap="square" lIns="91425" tIns="91425" rIns="91425" bIns="91425" anchor="t" anchorCtr="0">
+            <a:normAutofit fontScale="77500" lnSpcReduction="20000"/>
+          </a:bodyPr>
+          <a:lstStyle>
+            <a:defPPr marR="0" lvl="0" algn="l" rtl="0">
+              <a:lnSpc>
+                <a:spcPct val="100000"/>
+              </a:lnSpc>
+              <a:spcBef>
+                <a:spcPts val="0"/>
+              </a:spcBef>
+              <a:spcAft>
+                <a:spcPts val="0"/>
+              </a:spcAft>
+            </a:defPPr>
+            <a:lvl1pPr marR="0" lvl="0" algn="l" rtl="0">
+              <a:lnSpc>
+                <a:spcPct val="100000"/>
+              </a:lnSpc>
+              <a:spcBef>
+                <a:spcPts val="0"/>
+              </a:spcBef>
+              <a:spcAft>
+                <a:spcPts val="0"/>
+              </a:spcAft>
+              <a:buClr>
+                <a:schemeClr val="dk1"/>
+              </a:buClr>
+              <a:buSzPts val="2800"/>
+              <a:buFont typeface="Arial"/>
+              <a:buNone/>
+              <a:defRPr sz="2800" b="0" i="0" u="none" strike="noStrike" cap="none">
+                <a:solidFill>
+                  <a:schemeClr val="dk1"/>
+                </a:solidFill>
+                <a:latin typeface="Arial"/>
+                <a:ea typeface="Arial"/>
+                <a:cs typeface="Arial"/>
+                <a:sym typeface="Arial"/>
+              </a:defRPr>
+            </a:lvl1pPr>
+            <a:lvl2pPr marR="0" lvl="1" algn="l" rtl="0">
+              <a:lnSpc>
+                <a:spcPct val="100000"/>
+              </a:lnSpc>
+              <a:spcBef>
+                <a:spcPts val="0"/>
+              </a:spcBef>
+              <a:spcAft>
+                <a:spcPts val="0"/>
+              </a:spcAft>
+              <a:buClr>
+                <a:schemeClr val="dk1"/>
+              </a:buClr>
+              <a:buSzPts val="2800"/>
+              <a:buFont typeface="Arial"/>
+              <a:buNone/>
+              <a:defRPr sz="2800" b="0" i="0" u="none" strike="noStrike" cap="none">
+                <a:solidFill>
+                  <a:schemeClr val="dk1"/>
+                </a:solidFill>
+                <a:latin typeface="Arial"/>
+                <a:ea typeface="Arial"/>
+                <a:cs typeface="Arial"/>
+                <a:sym typeface="Arial"/>
+              </a:defRPr>
+            </a:lvl2pPr>
+            <a:lvl3pPr marR="0" lvl="2" algn="l" rtl="0">
+              <a:lnSpc>
+                <a:spcPct val="100000"/>
+              </a:lnSpc>
+              <a:spcBef>
+                <a:spcPts val="0"/>
+              </a:spcBef>
+              <a:spcAft>
+                <a:spcPts val="0"/>
+              </a:spcAft>
+              <a:buClr>
+                <a:schemeClr val="dk1"/>
+              </a:buClr>
+              <a:buSzPts val="2800"/>
+              <a:buFont typeface="Arial"/>
+              <a:buNone/>
+              <a:defRPr sz="2800" b="0" i="0" u="none" strike="noStrike" cap="none">
+                <a:solidFill>
+                  <a:schemeClr val="dk1"/>
+                </a:solidFill>
+                <a:latin typeface="Arial"/>
+                <a:ea typeface="Arial"/>
+                <a:cs typeface="Arial"/>
+                <a:sym typeface="Arial"/>
+              </a:defRPr>
+            </a:lvl3pPr>
+            <a:lvl4pPr marR="0" lvl="3" algn="l" rtl="0">
+              <a:lnSpc>
+                <a:spcPct val="100000"/>
+              </a:lnSpc>
+              <a:spcBef>
+                <a:spcPts val="0"/>
+              </a:spcBef>
+              <a:spcAft>
+                <a:spcPts val="0"/>
+              </a:spcAft>
+              <a:buClr>
+                <a:schemeClr val="dk1"/>
+              </a:buClr>
+              <a:buSzPts val="2800"/>
+              <a:buFont typeface="Arial"/>
+              <a:buNone/>
+              <a:defRPr sz="2800" b="0" i="0" u="none" strike="noStrike" cap="none">
+                <a:solidFill>
+                  <a:schemeClr val="dk1"/>
+                </a:solidFill>
+                <a:latin typeface="Arial"/>
+                <a:ea typeface="Arial"/>
+                <a:cs typeface="Arial"/>
+                <a:sym typeface="Arial"/>
+              </a:defRPr>
+            </a:lvl4pPr>
+            <a:lvl5pPr marR="0" lvl="4" algn="l" rtl="0">
+              <a:lnSpc>
+                <a:spcPct val="100000"/>
+              </a:lnSpc>
+              <a:spcBef>
+                <a:spcPts val="0"/>
+              </a:spcBef>
+              <a:spcAft>
+                <a:spcPts val="0"/>
+              </a:spcAft>
+              <a:buClr>
+                <a:schemeClr val="dk1"/>
+              </a:buClr>
+              <a:buSzPts val="2800"/>
+              <a:buFont typeface="Arial"/>
+              <a:buNone/>
+              <a:defRPr sz="2800" b="0" i="0" u="none" strike="noStrike" cap="none">
+                <a:solidFill>
+                  <a:schemeClr val="dk1"/>
+                </a:solidFill>
+                <a:latin typeface="Arial"/>
+                <a:ea typeface="Arial"/>
+                <a:cs typeface="Arial"/>
+                <a:sym typeface="Arial"/>
+              </a:defRPr>
+            </a:lvl5pPr>
+            <a:lvl6pPr marR="0" lvl="5" algn="l" rtl="0">
+              <a:lnSpc>
+                <a:spcPct val="100000"/>
+              </a:lnSpc>
+              <a:spcBef>
+                <a:spcPts val="0"/>
+              </a:spcBef>
+              <a:spcAft>
+                <a:spcPts val="0"/>
+              </a:spcAft>
+              <a:buClr>
+                <a:schemeClr val="dk1"/>
+              </a:buClr>
+              <a:buSzPts val="2800"/>
+              <a:buFont typeface="Arial"/>
+              <a:buNone/>
+              <a:defRPr sz="2800" b="0" i="0" u="none" strike="noStrike" cap="none">
+                <a:solidFill>
+                  <a:schemeClr val="dk1"/>
+                </a:solidFill>
+                <a:latin typeface="Arial"/>
+                <a:ea typeface="Arial"/>
+                <a:cs typeface="Arial"/>
+                <a:sym typeface="Arial"/>
+              </a:defRPr>
+            </a:lvl6pPr>
+            <a:lvl7pPr marR="0" lvl="6" algn="l" rtl="0">
+              <a:lnSpc>
+                <a:spcPct val="100000"/>
+              </a:lnSpc>
+              <a:spcBef>
+                <a:spcPts val="0"/>
+              </a:spcBef>
+              <a:spcAft>
+                <a:spcPts val="0"/>
+              </a:spcAft>
+              <a:buClr>
+                <a:schemeClr val="dk1"/>
+              </a:buClr>
+              <a:buSzPts val="2800"/>
+              <a:buFont typeface="Arial"/>
+              <a:buNone/>
+              <a:defRPr sz="2800" b="0" i="0" u="none" strike="noStrike" cap="none">
+                <a:solidFill>
+                  <a:schemeClr val="dk1"/>
+                </a:solidFill>
+                <a:latin typeface="Arial"/>
+                <a:ea typeface="Arial"/>
+                <a:cs typeface="Arial"/>
+                <a:sym typeface="Arial"/>
+              </a:defRPr>
+            </a:lvl7pPr>
+            <a:lvl8pPr marR="0" lvl="7" algn="l" rtl="0">
+              <a:lnSpc>
+                <a:spcPct val="100000"/>
+              </a:lnSpc>
+              <a:spcBef>
+                <a:spcPts val="0"/>
+              </a:spcBef>
+              <a:spcAft>
+                <a:spcPts val="0"/>
+              </a:spcAft>
+              <a:buClr>
+                <a:schemeClr val="dk1"/>
+              </a:buClr>
+              <a:buSzPts val="2800"/>
+              <a:buFont typeface="Arial"/>
+              <a:buNone/>
+              <a:defRPr sz="2800" b="0" i="0" u="none" strike="noStrike" cap="none">
+                <a:solidFill>
+                  <a:schemeClr val="dk1"/>
+                </a:solidFill>
+                <a:latin typeface="Arial"/>
+                <a:ea typeface="Arial"/>
+                <a:cs typeface="Arial"/>
+                <a:sym typeface="Arial"/>
+              </a:defRPr>
+            </a:lvl8pPr>
+            <a:lvl9pPr marR="0" lvl="8" algn="l" rtl="0">
+              <a:lnSpc>
+                <a:spcPct val="100000"/>
+              </a:lnSpc>
+              <a:spcBef>
+                <a:spcPts val="0"/>
+              </a:spcBef>
+              <a:spcAft>
+                <a:spcPts val="0"/>
+              </a:spcAft>
+              <a:buClr>
+                <a:schemeClr val="dk1"/>
+              </a:buClr>
+              <a:buSzPts val="2800"/>
+              <a:buFont typeface="Arial"/>
+              <a:buNone/>
+              <a:defRPr sz="2800" b="0" i="0" u="none" strike="noStrike" cap="none">
+                <a:solidFill>
+                  <a:schemeClr val="dk1"/>
+                </a:solidFill>
+                <a:latin typeface="Arial"/>
+                <a:ea typeface="Arial"/>
+                <a:cs typeface="Arial"/>
+                <a:sym typeface="Arial"/>
+              </a:defRPr>
+            </a:lvl9pPr>
+          </a:lstStyle>
+          <a:p>
+            <a:pPr marL="457200" indent="-457200" algn="ctr">
+              <a:buFont typeface="Arial" panose="020B0604020202020204" pitchFamily="34" charset="0"/>
+              <a:buChar char="•"/>
+            </a:pPr>
+            <a:r>
+              <a:rPr lang="es-AR" dirty="0" smtClean="0"/>
+              <a:t>Busca el mensaje en la carpeta actual.</a:t>
+            </a:r>
+          </a:p>
+          <a:p>
+            <a:pPr marL="457200" indent="-457200" algn="ctr">
+              <a:buFont typeface="Arial" panose="020B0604020202020204" pitchFamily="34" charset="0"/>
+              <a:buChar char="•"/>
+            </a:pPr>
+            <a:r>
+              <a:rPr lang="es-AR" dirty="0" smtClean="0"/>
+              <a:t>Lo elimina de la carpeta de origen y lo agrega en la carpeta destino.</a:t>
+            </a:r>
+          </a:p>
+          <a:p>
+            <a:pPr marL="457200" indent="-457200" algn="ctr">
+              <a:buFont typeface="Arial" panose="020B0604020202020204" pitchFamily="34" charset="0"/>
+              <a:buChar char="•"/>
+            </a:pPr>
+            <a:r>
+              <a:rPr lang="es-AR" dirty="0" smtClean="0"/>
+              <a:t>Revisa recursivamente en subcarpetas.</a:t>
+            </a:r>
+          </a:p>
+          <a:p>
+            <a:pPr marL="457200" indent="-457200" algn="ctr">
+              <a:buFont typeface="Arial" panose="020B0604020202020204" pitchFamily="34" charset="0"/>
+              <a:buChar char="•"/>
+            </a:pPr>
+            <a:r>
+              <a:rPr lang="es-AR" dirty="0" smtClean="0"/>
+              <a:t>Devuelve TRUE si lo movió.</a:t>
+            </a:r>
+          </a:p>
+          <a:p>
+            <a:endParaRPr lang="es-AR" dirty="0"/>
+          </a:p>
+        </p:txBody>
+      </p:sp>
     </p:spTree>
   </p:cSld>
   <p:clrMapOvr>
@@ -8514,7 +8832,7 @@
   <p:cSld>
     <p:spTree>
       <p:nvGrpSpPr>
-        <p:cNvPr id="1" name="Shape 150"/>
+        <p:cNvPr id="1" name=""/>
         <p:cNvGrpSpPr/>
         <p:nvPr/>
       </p:nvGrpSpPr>
@@ -8528,8 +8846,8 @@
       </p:grpSpPr>
       <p:sp>
         <p:nvSpPr>
-          <p:cNvPr id="151" name="Google Shape;151;p28"/>
-          <p:cNvSpPr txBox="1">
+          <p:cNvPr id="2" name="1 Título"/>
+          <p:cNvSpPr>
             <a:spLocks noGrp="1"/>
           </p:cNvSpPr>
           <p:nvPr>
@@ -8538,54 +8856,52 @@
         </p:nvSpPr>
         <p:spPr>
           <a:xfrm>
-            <a:off x="311700" y="445025"/>
-            <a:ext cx="8520600" cy="572700"/>
-          </a:xfrm>
-          <a:prstGeom prst="rect">
-            <a:avLst/>
-          </a:prstGeom>
+            <a:off x="2720621" y="207958"/>
+            <a:ext cx="5773011" cy="572700"/>
+          </a:xfrm>
         </p:spPr>
         <p:txBody>
-          <a:bodyPr spcFirstLastPara="1" wrap="square" lIns="91425" tIns="91425" rIns="91425" bIns="91425" anchor="t" anchorCtr="0">
+          <a:bodyPr>
             <a:normAutofit fontScale="90000"/>
           </a:bodyPr>
           <a:lstStyle/>
           <a:p>
-            <a:pPr marL="0" lvl="0" indent="0" algn="ctr" rtl="0">
-              <a:spcBef>
-                <a:spcPts val="0"/>
-              </a:spcBef>
-              <a:spcAft>
-                <a:spcPts val="0"/>
-              </a:spcAft>
-              <a:buNone/>
-            </a:pPr>
             <a:r>
-              <a:rPr lang="es"/>
-              <a:t>Mostrar árbol completo</a:t>
+              <a:rPr lang="es-AR" dirty="0" smtClean="0"/>
+              <a:t>Cola de prioridad</a:t>
             </a:r>
-            <a:endParaRPr/>
+            <a:br>
+              <a:rPr lang="es-AR" dirty="0" smtClean="0"/>
+            </a:br>
+            <a:endParaRPr lang="es-AR" dirty="0"/>
           </a:p>
         </p:txBody>
       </p:sp>
       <p:pic>
         <p:nvPicPr>
-          <p:cNvPr id="152" name="Google Shape;152;p28"/>
-          <p:cNvPicPr preferRelativeResize="0"/>
+          <p:cNvPr id="2050" name="Picture 2"/>
+          <p:cNvPicPr>
+            <a:picLocks noChangeAspect="1" noChangeArrowheads="1"/>
+          </p:cNvPicPr>
           <p:nvPr/>
         </p:nvPicPr>
         <p:blipFill>
-          <a:blip r:embed="rId3">
-            <a:alphaModFix/>
+          <a:blip r:embed="rId2">
+            <a:extLst>
+              <a:ext uri="{28A0092B-C50C-407E-A947-70E740481C1C}">
+                <a14:useLocalDpi xmlns:a14="http://schemas.microsoft.com/office/drawing/2010/main" val="0"/>
+              </a:ext>
+            </a:extLst>
           </a:blip>
+          <a:srcRect/>
           <a:stretch>
             <a:fillRect/>
           </a:stretch>
         </p:blipFill>
-        <p:spPr>
-          <a:xfrm>
-            <a:off x="2538400" y="1478750"/>
-            <a:ext cx="4067175" cy="1200150"/>
+        <p:spPr bwMode="auto">
+          <a:xfrm>
+            <a:off x="142699" y="798160"/>
+            <a:ext cx="4772025" cy="3095625"/>
           </a:xfrm>
           <a:prstGeom prst="rect">
             <a:avLst/>
@@ -8594,9 +8910,388 @@
           <a:ln>
             <a:noFill/>
           </a:ln>
+          <a:extLst>
+            <a:ext uri="{909E8E84-426E-40DD-AFC4-6F175D3DCCD1}">
+              <a14:hiddenFill xmlns:a14="http://schemas.microsoft.com/office/drawing/2010/main">
+                <a:solidFill>
+                  <a:schemeClr val="accent1"/>
+                </a:solidFill>
+              </a14:hiddenFill>
+            </a:ext>
+            <a:ext uri="{91240B29-F687-4F45-9708-019B960494DF}">
+              <a14:hiddenLine xmlns:a14="http://schemas.microsoft.com/office/drawing/2010/main" w="9525">
+                <a:solidFill>
+                  <a:schemeClr val="tx1"/>
+                </a:solidFill>
+                <a:miter lim="800000"/>
+                <a:headEnd/>
+                <a:tailEnd/>
+              </a14:hiddenLine>
+            </a:ext>
+          </a:extLst>
         </p:spPr>
       </p:pic>
+      <p:pic>
+        <p:nvPicPr>
+          <p:cNvPr id="2051" name="Picture 3"/>
+          <p:cNvPicPr>
+            <a:picLocks noChangeAspect="1" noChangeArrowheads="1"/>
+          </p:cNvPicPr>
+          <p:nvPr/>
+        </p:nvPicPr>
+        <p:blipFill>
+          <a:blip r:embed="rId3">
+            <a:extLst>
+              <a:ext uri="{28A0092B-C50C-407E-A947-70E740481C1C}">
+                <a14:useLocalDpi xmlns:a14="http://schemas.microsoft.com/office/drawing/2010/main" val="0"/>
+              </a:ext>
+            </a:extLst>
+          </a:blip>
+          <a:srcRect/>
+          <a:stretch>
+            <a:fillRect/>
+          </a:stretch>
+        </p:blipFill>
+        <p:spPr bwMode="auto">
+          <a:xfrm>
+            <a:off x="5016324" y="923043"/>
+            <a:ext cx="4019550" cy="2371725"/>
+          </a:xfrm>
+          <a:prstGeom prst="rect">
+            <a:avLst/>
+          </a:prstGeom>
+          <a:noFill/>
+          <a:ln>
+            <a:noFill/>
+          </a:ln>
+          <a:extLst>
+            <a:ext uri="{909E8E84-426E-40DD-AFC4-6F175D3DCCD1}">
+              <a14:hiddenFill xmlns:a14="http://schemas.microsoft.com/office/drawing/2010/main">
+                <a:solidFill>
+                  <a:schemeClr val="accent1"/>
+                </a:solidFill>
+              </a14:hiddenFill>
+            </a:ext>
+            <a:ext uri="{91240B29-F687-4F45-9708-019B960494DF}">
+              <a14:hiddenLine xmlns:a14="http://schemas.microsoft.com/office/drawing/2010/main" w="9525">
+                <a:solidFill>
+                  <a:schemeClr val="tx1"/>
+                </a:solidFill>
+                <a:miter lim="800000"/>
+                <a:headEnd/>
+                <a:tailEnd/>
+              </a14:hiddenLine>
+            </a:ext>
+          </a:extLst>
+        </p:spPr>
+      </p:pic>
+      <p:sp>
+        <p:nvSpPr>
+          <p:cNvPr id="6" name="1 Título"/>
+          <p:cNvSpPr txBox="1">
+            <a:spLocks/>
+          </p:cNvSpPr>
+          <p:nvPr/>
+        </p:nvSpPr>
+        <p:spPr>
+          <a:xfrm>
+            <a:off x="1473198" y="4063118"/>
+            <a:ext cx="5773011" cy="1249715"/>
+          </a:xfrm>
+          <a:prstGeom prst="rect">
+            <a:avLst/>
+          </a:prstGeom>
+          <a:noFill/>
+          <a:ln>
+            <a:noFill/>
+          </a:ln>
+        </p:spPr>
+        <p:txBody>
+          <a:bodyPr spcFirstLastPara="1" wrap="square" lIns="91425" tIns="91425" rIns="91425" bIns="91425" anchor="t" anchorCtr="0">
+            <a:normAutofit fontScale="60000" lnSpcReduction="20000"/>
+          </a:bodyPr>
+          <a:lstStyle>
+            <a:defPPr marR="0" lvl="0" algn="l" rtl="0">
+              <a:lnSpc>
+                <a:spcPct val="100000"/>
+              </a:lnSpc>
+              <a:spcBef>
+                <a:spcPts val="0"/>
+              </a:spcBef>
+              <a:spcAft>
+                <a:spcPts val="0"/>
+              </a:spcAft>
+            </a:defPPr>
+            <a:lvl1pPr marR="0" lvl="0" algn="l" rtl="0">
+              <a:lnSpc>
+                <a:spcPct val="100000"/>
+              </a:lnSpc>
+              <a:spcBef>
+                <a:spcPts val="0"/>
+              </a:spcBef>
+              <a:spcAft>
+                <a:spcPts val="0"/>
+              </a:spcAft>
+              <a:buClr>
+                <a:schemeClr val="dk1"/>
+              </a:buClr>
+              <a:buSzPts val="2800"/>
+              <a:buFont typeface="Arial"/>
+              <a:buNone/>
+              <a:defRPr sz="2800" b="0" i="0" u="none" strike="noStrike" cap="none">
+                <a:solidFill>
+                  <a:schemeClr val="dk1"/>
+                </a:solidFill>
+                <a:latin typeface="Arial"/>
+                <a:ea typeface="Arial"/>
+                <a:cs typeface="Arial"/>
+                <a:sym typeface="Arial"/>
+              </a:defRPr>
+            </a:lvl1pPr>
+            <a:lvl2pPr marR="0" lvl="1" algn="l" rtl="0">
+              <a:lnSpc>
+                <a:spcPct val="100000"/>
+              </a:lnSpc>
+              <a:spcBef>
+                <a:spcPts val="0"/>
+              </a:spcBef>
+              <a:spcAft>
+                <a:spcPts val="0"/>
+              </a:spcAft>
+              <a:buClr>
+                <a:schemeClr val="dk1"/>
+              </a:buClr>
+              <a:buSzPts val="2800"/>
+              <a:buFont typeface="Arial"/>
+              <a:buNone/>
+              <a:defRPr sz="2800" b="0" i="0" u="none" strike="noStrike" cap="none">
+                <a:solidFill>
+                  <a:schemeClr val="dk1"/>
+                </a:solidFill>
+                <a:latin typeface="Arial"/>
+                <a:ea typeface="Arial"/>
+                <a:cs typeface="Arial"/>
+                <a:sym typeface="Arial"/>
+              </a:defRPr>
+            </a:lvl2pPr>
+            <a:lvl3pPr marR="0" lvl="2" algn="l" rtl="0">
+              <a:lnSpc>
+                <a:spcPct val="100000"/>
+              </a:lnSpc>
+              <a:spcBef>
+                <a:spcPts val="0"/>
+              </a:spcBef>
+              <a:spcAft>
+                <a:spcPts val="0"/>
+              </a:spcAft>
+              <a:buClr>
+                <a:schemeClr val="dk1"/>
+              </a:buClr>
+              <a:buSzPts val="2800"/>
+              <a:buFont typeface="Arial"/>
+              <a:buNone/>
+              <a:defRPr sz="2800" b="0" i="0" u="none" strike="noStrike" cap="none">
+                <a:solidFill>
+                  <a:schemeClr val="dk1"/>
+                </a:solidFill>
+                <a:latin typeface="Arial"/>
+                <a:ea typeface="Arial"/>
+                <a:cs typeface="Arial"/>
+                <a:sym typeface="Arial"/>
+              </a:defRPr>
+            </a:lvl3pPr>
+            <a:lvl4pPr marR="0" lvl="3" algn="l" rtl="0">
+              <a:lnSpc>
+                <a:spcPct val="100000"/>
+              </a:lnSpc>
+              <a:spcBef>
+                <a:spcPts val="0"/>
+              </a:spcBef>
+              <a:spcAft>
+                <a:spcPts val="0"/>
+              </a:spcAft>
+              <a:buClr>
+                <a:schemeClr val="dk1"/>
+              </a:buClr>
+              <a:buSzPts val="2800"/>
+              <a:buFont typeface="Arial"/>
+              <a:buNone/>
+              <a:defRPr sz="2800" b="0" i="0" u="none" strike="noStrike" cap="none">
+                <a:solidFill>
+                  <a:schemeClr val="dk1"/>
+                </a:solidFill>
+                <a:latin typeface="Arial"/>
+                <a:ea typeface="Arial"/>
+                <a:cs typeface="Arial"/>
+                <a:sym typeface="Arial"/>
+              </a:defRPr>
+            </a:lvl4pPr>
+            <a:lvl5pPr marR="0" lvl="4" algn="l" rtl="0">
+              <a:lnSpc>
+                <a:spcPct val="100000"/>
+              </a:lnSpc>
+              <a:spcBef>
+                <a:spcPts val="0"/>
+              </a:spcBef>
+              <a:spcAft>
+                <a:spcPts val="0"/>
+              </a:spcAft>
+              <a:buClr>
+                <a:schemeClr val="dk1"/>
+              </a:buClr>
+              <a:buSzPts val="2800"/>
+              <a:buFont typeface="Arial"/>
+              <a:buNone/>
+              <a:defRPr sz="2800" b="0" i="0" u="none" strike="noStrike" cap="none">
+                <a:solidFill>
+                  <a:schemeClr val="dk1"/>
+                </a:solidFill>
+                <a:latin typeface="Arial"/>
+                <a:ea typeface="Arial"/>
+                <a:cs typeface="Arial"/>
+                <a:sym typeface="Arial"/>
+              </a:defRPr>
+            </a:lvl5pPr>
+            <a:lvl6pPr marR="0" lvl="5" algn="l" rtl="0">
+              <a:lnSpc>
+                <a:spcPct val="100000"/>
+              </a:lnSpc>
+              <a:spcBef>
+                <a:spcPts val="0"/>
+              </a:spcBef>
+              <a:spcAft>
+                <a:spcPts val="0"/>
+              </a:spcAft>
+              <a:buClr>
+                <a:schemeClr val="dk1"/>
+              </a:buClr>
+              <a:buSzPts val="2800"/>
+              <a:buFont typeface="Arial"/>
+              <a:buNone/>
+              <a:defRPr sz="2800" b="0" i="0" u="none" strike="noStrike" cap="none">
+                <a:solidFill>
+                  <a:schemeClr val="dk1"/>
+                </a:solidFill>
+                <a:latin typeface="Arial"/>
+                <a:ea typeface="Arial"/>
+                <a:cs typeface="Arial"/>
+                <a:sym typeface="Arial"/>
+              </a:defRPr>
+            </a:lvl6pPr>
+            <a:lvl7pPr marR="0" lvl="6" algn="l" rtl="0">
+              <a:lnSpc>
+                <a:spcPct val="100000"/>
+              </a:lnSpc>
+              <a:spcBef>
+                <a:spcPts val="0"/>
+              </a:spcBef>
+              <a:spcAft>
+                <a:spcPts val="0"/>
+              </a:spcAft>
+              <a:buClr>
+                <a:schemeClr val="dk1"/>
+              </a:buClr>
+              <a:buSzPts val="2800"/>
+              <a:buFont typeface="Arial"/>
+              <a:buNone/>
+              <a:defRPr sz="2800" b="0" i="0" u="none" strike="noStrike" cap="none">
+                <a:solidFill>
+                  <a:schemeClr val="dk1"/>
+                </a:solidFill>
+                <a:latin typeface="Arial"/>
+                <a:ea typeface="Arial"/>
+                <a:cs typeface="Arial"/>
+                <a:sym typeface="Arial"/>
+              </a:defRPr>
+            </a:lvl7pPr>
+            <a:lvl8pPr marR="0" lvl="7" algn="l" rtl="0">
+              <a:lnSpc>
+                <a:spcPct val="100000"/>
+              </a:lnSpc>
+              <a:spcBef>
+                <a:spcPts val="0"/>
+              </a:spcBef>
+              <a:spcAft>
+                <a:spcPts val="0"/>
+              </a:spcAft>
+              <a:buClr>
+                <a:schemeClr val="dk1"/>
+              </a:buClr>
+              <a:buSzPts val="2800"/>
+              <a:buFont typeface="Arial"/>
+              <a:buNone/>
+              <a:defRPr sz="2800" b="0" i="0" u="none" strike="noStrike" cap="none">
+                <a:solidFill>
+                  <a:schemeClr val="dk1"/>
+                </a:solidFill>
+                <a:latin typeface="Arial"/>
+                <a:ea typeface="Arial"/>
+                <a:cs typeface="Arial"/>
+                <a:sym typeface="Arial"/>
+              </a:defRPr>
+            </a:lvl8pPr>
+            <a:lvl9pPr marR="0" lvl="8" algn="l" rtl="0">
+              <a:lnSpc>
+                <a:spcPct val="100000"/>
+              </a:lnSpc>
+              <a:spcBef>
+                <a:spcPts val="0"/>
+              </a:spcBef>
+              <a:spcAft>
+                <a:spcPts val="0"/>
+              </a:spcAft>
+              <a:buClr>
+                <a:schemeClr val="dk1"/>
+              </a:buClr>
+              <a:buSzPts val="2800"/>
+              <a:buFont typeface="Arial"/>
+              <a:buNone/>
+              <a:defRPr sz="2800" b="0" i="0" u="none" strike="noStrike" cap="none">
+                <a:solidFill>
+                  <a:schemeClr val="dk1"/>
+                </a:solidFill>
+                <a:latin typeface="Arial"/>
+                <a:ea typeface="Arial"/>
+                <a:cs typeface="Arial"/>
+                <a:sym typeface="Arial"/>
+              </a:defRPr>
+            </a:lvl9pPr>
+          </a:lstStyle>
+          <a:p>
+            <a:pPr marL="457200" indent="-457200">
+              <a:buFont typeface="Arial" panose="020B0604020202020204" pitchFamily="34" charset="0"/>
+              <a:buChar char="•"/>
+            </a:pPr>
+            <a:r>
+              <a:rPr lang="es-AR" dirty="0" smtClean="0"/>
+              <a:t>Los urgentes se muestran primeros.</a:t>
+            </a:r>
+          </a:p>
+          <a:p>
+            <a:endParaRPr lang="es-AR" dirty="0" smtClean="0"/>
+          </a:p>
+          <a:p>
+            <a:pPr marL="457200" indent="-457200">
+              <a:buFont typeface="Arial" panose="020B0604020202020204" pitchFamily="34" charset="0"/>
+              <a:buChar char="•"/>
+            </a:pPr>
+            <a:r>
+              <a:rPr lang="es-AR" dirty="0" smtClean="0"/>
+              <a:t>Los mensajes van a la cola de prioridad si son urgentes o a mensajes normales.</a:t>
+            </a:r>
+            <a:br>
+              <a:rPr lang="es-AR" dirty="0" smtClean="0"/>
+            </a:br>
+            <a:endParaRPr lang="es-AR" dirty="0"/>
+          </a:p>
+        </p:txBody>
+      </p:sp>
     </p:spTree>
+    <p:extLst>
+      <p:ext uri="{BB962C8B-B14F-4D97-AF65-F5344CB8AC3E}">
+        <p14:creationId xmlns:p14="http://schemas.microsoft.com/office/powerpoint/2010/main" val="1225813568"/>
+      </p:ext>
+    </p:extLst>
   </p:cSld>
   <p:clrMapOvr>
     <a:masterClrMapping/>
@@ -8705,6 +9400,450 @@
           </a:p>
         </p:txBody>
       </p:sp>
+    </p:spTree>
+  </p:cSld>
+  <p:clrMapOvr>
+    <a:masterClrMapping/>
+  </p:clrMapOvr>
+</p:sld>
+</file>
+
+<file path=ppt/slides/slide20.xml><?xml version="1.0" encoding="utf-8"?>
+<p:sld xmlns:a="http://schemas.openxmlformats.org/drawingml/2006/main" xmlns:r="http://schemas.openxmlformats.org/officeDocument/2006/relationships" xmlns:p="http://schemas.openxmlformats.org/presentationml/2006/main">
+  <p:cSld>
+    <p:spTree>
+      <p:nvGrpSpPr>
+        <p:cNvPr id="1" name="Shape 150"/>
+        <p:cNvGrpSpPr/>
+        <p:nvPr/>
+      </p:nvGrpSpPr>
+      <p:grpSpPr>
+        <a:xfrm>
+          <a:off x="0" y="0"/>
+          <a:ext cx="0" cy="0"/>
+          <a:chOff x="0" y="0"/>
+          <a:chExt cx="0" cy="0"/>
+        </a:xfrm>
+      </p:grpSpPr>
+      <p:sp>
+        <p:nvSpPr>
+          <p:cNvPr id="151" name="Google Shape;151;p28"/>
+          <p:cNvSpPr txBox="1">
+            <a:spLocks noGrp="1"/>
+          </p:cNvSpPr>
+          <p:nvPr>
+            <p:ph type="title"/>
+          </p:nvPr>
+        </p:nvSpPr>
+        <p:spPr>
+          <a:xfrm>
+            <a:off x="311700" y="445025"/>
+            <a:ext cx="8520600" cy="572700"/>
+          </a:xfrm>
+          <a:prstGeom prst="rect">
+            <a:avLst/>
+          </a:prstGeom>
+        </p:spPr>
+        <p:txBody>
+          <a:bodyPr spcFirstLastPara="1" wrap="square" lIns="91425" tIns="91425" rIns="91425" bIns="91425" anchor="t" anchorCtr="0">
+            <a:normAutofit fontScale="90000"/>
+          </a:bodyPr>
+          <a:lstStyle/>
+          <a:p>
+            <a:pPr marL="0" lvl="0" indent="0" algn="ctr" rtl="0">
+              <a:spcBef>
+                <a:spcPts val="0"/>
+              </a:spcBef>
+              <a:spcAft>
+                <a:spcPts val="0"/>
+              </a:spcAft>
+              <a:buNone/>
+            </a:pPr>
+            <a:r>
+              <a:rPr lang="es" dirty="0"/>
+              <a:t>Mostrar árbol completo</a:t>
+            </a:r>
+            <a:endParaRPr dirty="0"/>
+          </a:p>
+        </p:txBody>
+      </p:sp>
+      <p:pic>
+        <p:nvPicPr>
+          <p:cNvPr id="152" name="Google Shape;152;p28"/>
+          <p:cNvPicPr preferRelativeResize="0"/>
+          <p:nvPr/>
+        </p:nvPicPr>
+        <p:blipFill>
+          <a:blip r:embed="rId3">
+            <a:alphaModFix/>
+          </a:blip>
+          <a:stretch>
+            <a:fillRect/>
+          </a:stretch>
+        </p:blipFill>
+        <p:spPr>
+          <a:xfrm>
+            <a:off x="307269" y="1478750"/>
+            <a:ext cx="4067175" cy="1200150"/>
+          </a:xfrm>
+          <a:prstGeom prst="rect">
+            <a:avLst/>
+          </a:prstGeom>
+          <a:noFill/>
+          <a:ln>
+            <a:noFill/>
+          </a:ln>
+        </p:spPr>
+      </p:pic>
+      <p:sp>
+        <p:nvSpPr>
+          <p:cNvPr id="4" name="Google Shape;151;p28"/>
+          <p:cNvSpPr txBox="1">
+            <a:spLocks/>
+          </p:cNvSpPr>
+          <p:nvPr/>
+        </p:nvSpPr>
+        <p:spPr>
+          <a:xfrm>
+            <a:off x="114144" y="3070577"/>
+            <a:ext cx="8520600" cy="1034659"/>
+          </a:xfrm>
+          <a:prstGeom prst="rect">
+            <a:avLst/>
+          </a:prstGeom>
+          <a:noFill/>
+          <a:ln>
+            <a:noFill/>
+          </a:ln>
+        </p:spPr>
+        <p:txBody>
+          <a:bodyPr spcFirstLastPara="1" wrap="square" lIns="91425" tIns="91425" rIns="91425" bIns="91425" anchor="t" anchorCtr="0">
+            <a:normAutofit fontScale="97500"/>
+          </a:bodyPr>
+          <a:lstStyle>
+            <a:defPPr marR="0" lvl="0" algn="l" rtl="0">
+              <a:lnSpc>
+                <a:spcPct val="100000"/>
+              </a:lnSpc>
+              <a:spcBef>
+                <a:spcPts val="0"/>
+              </a:spcBef>
+              <a:spcAft>
+                <a:spcPts val="0"/>
+              </a:spcAft>
+            </a:defPPr>
+            <a:lvl1pPr marR="0" lvl="0" algn="l" rtl="0">
+              <a:lnSpc>
+                <a:spcPct val="100000"/>
+              </a:lnSpc>
+              <a:spcBef>
+                <a:spcPts val="0"/>
+              </a:spcBef>
+              <a:spcAft>
+                <a:spcPts val="0"/>
+              </a:spcAft>
+              <a:buClr>
+                <a:schemeClr val="dk1"/>
+              </a:buClr>
+              <a:buSzPts val="2800"/>
+              <a:buFont typeface="Arial"/>
+              <a:buNone/>
+              <a:defRPr sz="2800" b="0" i="0" u="none" strike="noStrike" cap="none">
+                <a:solidFill>
+                  <a:schemeClr val="dk1"/>
+                </a:solidFill>
+                <a:latin typeface="Arial"/>
+                <a:ea typeface="Arial"/>
+                <a:cs typeface="Arial"/>
+                <a:sym typeface="Arial"/>
+              </a:defRPr>
+            </a:lvl1pPr>
+            <a:lvl2pPr marR="0" lvl="1" algn="l" rtl="0">
+              <a:lnSpc>
+                <a:spcPct val="100000"/>
+              </a:lnSpc>
+              <a:spcBef>
+                <a:spcPts val="0"/>
+              </a:spcBef>
+              <a:spcAft>
+                <a:spcPts val="0"/>
+              </a:spcAft>
+              <a:buClr>
+                <a:schemeClr val="dk1"/>
+              </a:buClr>
+              <a:buSzPts val="2800"/>
+              <a:buFont typeface="Arial"/>
+              <a:buNone/>
+              <a:defRPr sz="2800" b="0" i="0" u="none" strike="noStrike" cap="none">
+                <a:solidFill>
+                  <a:schemeClr val="dk1"/>
+                </a:solidFill>
+                <a:latin typeface="Arial"/>
+                <a:ea typeface="Arial"/>
+                <a:cs typeface="Arial"/>
+                <a:sym typeface="Arial"/>
+              </a:defRPr>
+            </a:lvl2pPr>
+            <a:lvl3pPr marR="0" lvl="2" algn="l" rtl="0">
+              <a:lnSpc>
+                <a:spcPct val="100000"/>
+              </a:lnSpc>
+              <a:spcBef>
+                <a:spcPts val="0"/>
+              </a:spcBef>
+              <a:spcAft>
+                <a:spcPts val="0"/>
+              </a:spcAft>
+              <a:buClr>
+                <a:schemeClr val="dk1"/>
+              </a:buClr>
+              <a:buSzPts val="2800"/>
+              <a:buFont typeface="Arial"/>
+              <a:buNone/>
+              <a:defRPr sz="2800" b="0" i="0" u="none" strike="noStrike" cap="none">
+                <a:solidFill>
+                  <a:schemeClr val="dk1"/>
+                </a:solidFill>
+                <a:latin typeface="Arial"/>
+                <a:ea typeface="Arial"/>
+                <a:cs typeface="Arial"/>
+                <a:sym typeface="Arial"/>
+              </a:defRPr>
+            </a:lvl3pPr>
+            <a:lvl4pPr marR="0" lvl="3" algn="l" rtl="0">
+              <a:lnSpc>
+                <a:spcPct val="100000"/>
+              </a:lnSpc>
+              <a:spcBef>
+                <a:spcPts val="0"/>
+              </a:spcBef>
+              <a:spcAft>
+                <a:spcPts val="0"/>
+              </a:spcAft>
+              <a:buClr>
+                <a:schemeClr val="dk1"/>
+              </a:buClr>
+              <a:buSzPts val="2800"/>
+              <a:buFont typeface="Arial"/>
+              <a:buNone/>
+              <a:defRPr sz="2800" b="0" i="0" u="none" strike="noStrike" cap="none">
+                <a:solidFill>
+                  <a:schemeClr val="dk1"/>
+                </a:solidFill>
+                <a:latin typeface="Arial"/>
+                <a:ea typeface="Arial"/>
+                <a:cs typeface="Arial"/>
+                <a:sym typeface="Arial"/>
+              </a:defRPr>
+            </a:lvl4pPr>
+            <a:lvl5pPr marR="0" lvl="4" algn="l" rtl="0">
+              <a:lnSpc>
+                <a:spcPct val="100000"/>
+              </a:lnSpc>
+              <a:spcBef>
+                <a:spcPts val="0"/>
+              </a:spcBef>
+              <a:spcAft>
+                <a:spcPts val="0"/>
+              </a:spcAft>
+              <a:buClr>
+                <a:schemeClr val="dk1"/>
+              </a:buClr>
+              <a:buSzPts val="2800"/>
+              <a:buFont typeface="Arial"/>
+              <a:buNone/>
+              <a:defRPr sz="2800" b="0" i="0" u="none" strike="noStrike" cap="none">
+                <a:solidFill>
+                  <a:schemeClr val="dk1"/>
+                </a:solidFill>
+                <a:latin typeface="Arial"/>
+                <a:ea typeface="Arial"/>
+                <a:cs typeface="Arial"/>
+                <a:sym typeface="Arial"/>
+              </a:defRPr>
+            </a:lvl5pPr>
+            <a:lvl6pPr marR="0" lvl="5" algn="l" rtl="0">
+              <a:lnSpc>
+                <a:spcPct val="100000"/>
+              </a:lnSpc>
+              <a:spcBef>
+                <a:spcPts val="0"/>
+              </a:spcBef>
+              <a:spcAft>
+                <a:spcPts val="0"/>
+              </a:spcAft>
+              <a:buClr>
+                <a:schemeClr val="dk1"/>
+              </a:buClr>
+              <a:buSzPts val="2800"/>
+              <a:buFont typeface="Arial"/>
+              <a:buNone/>
+              <a:defRPr sz="2800" b="0" i="0" u="none" strike="noStrike" cap="none">
+                <a:solidFill>
+                  <a:schemeClr val="dk1"/>
+                </a:solidFill>
+                <a:latin typeface="Arial"/>
+                <a:ea typeface="Arial"/>
+                <a:cs typeface="Arial"/>
+                <a:sym typeface="Arial"/>
+              </a:defRPr>
+            </a:lvl6pPr>
+            <a:lvl7pPr marR="0" lvl="6" algn="l" rtl="0">
+              <a:lnSpc>
+                <a:spcPct val="100000"/>
+              </a:lnSpc>
+              <a:spcBef>
+                <a:spcPts val="0"/>
+              </a:spcBef>
+              <a:spcAft>
+                <a:spcPts val="0"/>
+              </a:spcAft>
+              <a:buClr>
+                <a:schemeClr val="dk1"/>
+              </a:buClr>
+              <a:buSzPts val="2800"/>
+              <a:buFont typeface="Arial"/>
+              <a:buNone/>
+              <a:defRPr sz="2800" b="0" i="0" u="none" strike="noStrike" cap="none">
+                <a:solidFill>
+                  <a:schemeClr val="dk1"/>
+                </a:solidFill>
+                <a:latin typeface="Arial"/>
+                <a:ea typeface="Arial"/>
+                <a:cs typeface="Arial"/>
+                <a:sym typeface="Arial"/>
+              </a:defRPr>
+            </a:lvl7pPr>
+            <a:lvl8pPr marR="0" lvl="7" algn="l" rtl="0">
+              <a:lnSpc>
+                <a:spcPct val="100000"/>
+              </a:lnSpc>
+              <a:spcBef>
+                <a:spcPts val="0"/>
+              </a:spcBef>
+              <a:spcAft>
+                <a:spcPts val="0"/>
+              </a:spcAft>
+              <a:buClr>
+                <a:schemeClr val="dk1"/>
+              </a:buClr>
+              <a:buSzPts val="2800"/>
+              <a:buFont typeface="Arial"/>
+              <a:buNone/>
+              <a:defRPr sz="2800" b="0" i="0" u="none" strike="noStrike" cap="none">
+                <a:solidFill>
+                  <a:schemeClr val="dk1"/>
+                </a:solidFill>
+                <a:latin typeface="Arial"/>
+                <a:ea typeface="Arial"/>
+                <a:cs typeface="Arial"/>
+                <a:sym typeface="Arial"/>
+              </a:defRPr>
+            </a:lvl8pPr>
+            <a:lvl9pPr marR="0" lvl="8" algn="l" rtl="0">
+              <a:lnSpc>
+                <a:spcPct val="100000"/>
+              </a:lnSpc>
+              <a:spcBef>
+                <a:spcPts val="0"/>
+              </a:spcBef>
+              <a:spcAft>
+                <a:spcPts val="0"/>
+              </a:spcAft>
+              <a:buClr>
+                <a:schemeClr val="dk1"/>
+              </a:buClr>
+              <a:buSzPts val="2800"/>
+              <a:buFont typeface="Arial"/>
+              <a:buNone/>
+              <a:defRPr sz="2800" b="0" i="0" u="none" strike="noStrike" cap="none">
+                <a:solidFill>
+                  <a:schemeClr val="dk1"/>
+                </a:solidFill>
+                <a:latin typeface="Arial"/>
+                <a:ea typeface="Arial"/>
+                <a:cs typeface="Arial"/>
+                <a:sym typeface="Arial"/>
+              </a:defRPr>
+            </a:lvl9pPr>
+          </a:lstStyle>
+          <a:p>
+            <a:pPr marL="457200" indent="-457200" algn="ctr">
+              <a:buFont typeface="Arial" panose="020B0604020202020204" pitchFamily="34" charset="0"/>
+              <a:buChar char="•"/>
+            </a:pPr>
+            <a:r>
+              <a:rPr lang="es-AR" dirty="0" smtClean="0"/>
+              <a:t>Permite visualizar toda la estructura.</a:t>
+            </a:r>
+          </a:p>
+          <a:p>
+            <a:pPr marL="457200" indent="-457200" algn="ctr">
+              <a:buFont typeface="Arial" panose="020B0604020202020204" pitchFamily="34" charset="0"/>
+              <a:buChar char="•"/>
+            </a:pPr>
+            <a:r>
+              <a:rPr lang="es-AR" dirty="0" smtClean="0"/>
+              <a:t>Permite navegar todas la carpetas y subcarpetas</a:t>
+            </a:r>
+            <a:endParaRPr lang="es-AR" dirty="0"/>
+          </a:p>
+        </p:txBody>
+      </p:sp>
+      <p:pic>
+        <p:nvPicPr>
+          <p:cNvPr id="1026" name="Picture 2"/>
+          <p:cNvPicPr>
+            <a:picLocks noChangeAspect="1" noChangeArrowheads="1"/>
+          </p:cNvPicPr>
+          <p:nvPr/>
+        </p:nvPicPr>
+        <p:blipFill>
+          <a:blip r:embed="rId4">
+            <a:extLst>
+              <a:ext uri="{28A0092B-C50C-407E-A947-70E740481C1C}">
+                <a14:useLocalDpi xmlns:a14="http://schemas.microsoft.com/office/drawing/2010/main" val="0"/>
+              </a:ext>
+            </a:extLst>
+          </a:blip>
+          <a:srcRect/>
+          <a:stretch>
+            <a:fillRect/>
+          </a:stretch>
+        </p:blipFill>
+        <p:spPr bwMode="auto">
+          <a:xfrm>
+            <a:off x="4572000" y="1112037"/>
+            <a:ext cx="4095750" cy="1933575"/>
+          </a:xfrm>
+          <a:prstGeom prst="rect">
+            <a:avLst/>
+          </a:prstGeom>
+          <a:noFill/>
+          <a:ln>
+            <a:noFill/>
+          </a:ln>
+          <a:extLst>
+            <a:ext uri="{909E8E84-426E-40DD-AFC4-6F175D3DCCD1}">
+              <a14:hiddenFill xmlns:a14="http://schemas.microsoft.com/office/drawing/2010/main">
+                <a:solidFill>
+                  <a:schemeClr val="accent1"/>
+                </a:solidFill>
+              </a14:hiddenFill>
+            </a:ext>
+            <a:ext uri="{91240B29-F687-4F45-9708-019B960494DF}">
+              <a14:hiddenLine xmlns:a14="http://schemas.microsoft.com/office/drawing/2010/main" w="9525">
+                <a:solidFill>
+                  <a:schemeClr val="tx1"/>
+                </a:solidFill>
+                <a:miter lim="800000"/>
+                <a:headEnd/>
+                <a:tailEnd/>
+              </a14:hiddenLine>
+            </a:ext>
+          </a:extLst>
+        </p:spPr>
+      </p:pic>
     </p:spTree>
   </p:cSld>
   <p:clrMapOvr>

</xml_diff>